<commit_message>
added all diagrams to pptx
</commit_message>
<xml_diff>
--- a/architecture/Vorlage_Praesentation_2022 _2_2_OOD.pptx
+++ b/architecture/Vorlage_Praesentation_2022 _2_2_OOD.pptx
@@ -3111,29 +3111,41 @@
           <a:chExt cx="0" cy="0"/>
         </a:xfrm>
       </p:grpSpPr>
-      <p:sp>
-        <p:nvSpPr>
-          <p:cNvPr id="5" name="Inhaltsplatzhalter 4"/>
-          <p:cNvSpPr>
-            <a:spLocks noGrp="1"/>
-          </p:cNvSpPr>
+      <p:pic>
+        <p:nvPicPr>
+          <p:cNvPr id="6" name="Content Placeholder 5">
+            <a:extLst>
+              <a:ext uri="{FF2B5EF4-FFF2-40B4-BE49-F238E27FC236}">
+                <a16:creationId xmlns:a16="http://schemas.microsoft.com/office/drawing/2014/main" id="{26CD402B-56E8-B79C-4DF5-408BF821B8C9}"/>
+              </a:ext>
+            </a:extLst>
+          </p:cNvPr>
+          <p:cNvPicPr>
+            <a:picLocks noGrp="1" noChangeAspect="1"/>
+          </p:cNvPicPr>
           <p:nvPr>
             <p:ph idx="1"/>
           </p:nvPr>
-        </p:nvSpPr>
-        <p:spPr bwMode="auto"/>
-        <p:txBody>
-          <a:bodyPr anchor="ctr"/>
-          <a:lstStyle/>
-          <a:p>
-            <a:pPr marL="0" indent="0" algn="ctr">
-              <a:buNone/>
-              <a:defRPr/>
-            </a:pPr>
-            <a:endParaRPr dirty="0"/>
-          </a:p>
-        </p:txBody>
-      </p:sp>
+        </p:nvPicPr>
+        <p:blipFill>
+          <a:blip r:embed="rId2">
+            <a:extLst>
+              <a:ext uri="{28A0092B-C50C-407E-A947-70E740481C1C}">
+                <a14:useLocalDpi xmlns:a14="http://schemas.microsoft.com/office/drawing/2010/main" val="0"/>
+              </a:ext>
+            </a:extLst>
+          </a:blip>
+          <a:stretch>
+            <a:fillRect/>
+          </a:stretch>
+        </p:blipFill>
+        <p:spPr bwMode="auto">
+          <a:xfrm>
+            <a:off x="1195042" y="1201316"/>
+            <a:ext cx="7769916" cy="3952684"/>
+          </a:xfrm>
+        </p:spPr>
+      </p:pic>
       <p:sp>
         <p:nvSpPr>
           <p:cNvPr id="4" name="Titel 3"/>
@@ -3160,42 +3172,6 @@
           </a:p>
         </p:txBody>
       </p:sp>
-      <p:pic>
-        <p:nvPicPr>
-          <p:cNvPr id="2" name="Picture 1">
-            <a:extLst>
-              <a:ext uri="{FF2B5EF4-FFF2-40B4-BE49-F238E27FC236}">
-                <a16:creationId xmlns:a16="http://schemas.microsoft.com/office/drawing/2014/main" id="{D3FCA575-EE8B-3BAE-20EA-C66128B27033}"/>
-              </a:ext>
-            </a:extLst>
-          </p:cNvPr>
-          <p:cNvPicPr>
-            <a:picLocks noChangeAspect="1"/>
-          </p:cNvPicPr>
-          <p:nvPr/>
-        </p:nvPicPr>
-        <p:blipFill>
-          <a:blip r:embed="rId2">
-            <a:extLst>
-              <a:ext uri="{28A0092B-C50C-407E-A947-70E740481C1C}">
-                <a14:useLocalDpi xmlns:a14="http://schemas.microsoft.com/office/drawing/2010/main" val="0"/>
-              </a:ext>
-            </a:extLst>
-          </a:blip>
-          <a:stretch>
-            <a:fillRect/>
-          </a:stretch>
-        </p:blipFill>
-        <p:spPr bwMode="auto">
-          <a:xfrm>
-            <a:off x="1169311" y="1313380"/>
-            <a:ext cx="7530342" cy="3960491"/>
-          </a:xfrm>
-          <a:prstGeom prst="rect">
-            <a:avLst/>
-          </a:prstGeom>
-        </p:spPr>
-      </p:pic>
     </p:spTree>
   </p:cSld>
   <p:clrMapOvr>
@@ -3221,54 +3197,41 @@
           <a:chExt cx="0" cy="0"/>
         </a:xfrm>
       </p:grpSpPr>
-      <p:sp>
-        <p:nvSpPr>
-          <p:cNvPr id="5" name="Inhaltsplatzhalter 4"/>
-          <p:cNvSpPr>
-            <a:spLocks noGrp="1"/>
-          </p:cNvSpPr>
+      <p:pic>
+        <p:nvPicPr>
+          <p:cNvPr id="3" name="Content Placeholder 2">
+            <a:extLst>
+              <a:ext uri="{FF2B5EF4-FFF2-40B4-BE49-F238E27FC236}">
+                <a16:creationId xmlns:a16="http://schemas.microsoft.com/office/drawing/2014/main" id="{45336CE5-1370-BCF8-46B6-3F62A16F3C80}"/>
+              </a:ext>
+            </a:extLst>
+          </p:cNvPr>
+          <p:cNvPicPr>
+            <a:picLocks noGrp="1" noChangeAspect="1"/>
+          </p:cNvPicPr>
           <p:nvPr>
             <p:ph idx="1"/>
           </p:nvPr>
-        </p:nvSpPr>
-        <p:spPr bwMode="auto"/>
-        <p:txBody>
-          <a:bodyPr anchor="ctr"/>
-          <a:lstStyle/>
-          <a:p>
-            <a:pPr marL="0" indent="0" algn="ctr">
-              <a:buNone/>
-              <a:defRPr/>
-            </a:pPr>
-            <a:r>
-              <a:rPr lang="de-DE">
-                <a:solidFill>
-                  <a:srgbClr val="FF0000"/>
-                </a:solidFill>
-              </a:rPr>
-              <a:t>Beschreiben sie hier mit einem UML Komponentendiagramm bzw. Kompositionsstrukturdiagramm wie das System fachlich in die Komponenten zerlegt wird. Berücksichtigen sie dabei den Zusammenhang zur Grobarchitektur!</a:t>
-            </a:r>
-          </a:p>
-          <a:p>
-            <a:pPr marL="0" indent="0" algn="ctr">
-              <a:buNone/>
-              <a:defRPr/>
-            </a:pPr>
-            <a:r>
-              <a:rPr lang="de-DE" sz="2000" b="0" i="0" u="none" strike="noStrike" cap="none" spc="0">
-                <a:solidFill>
-                  <a:srgbClr val="FF0000"/>
-                </a:solidFill>
-                <a:latin typeface="Arial Unicode MS"/>
-                <a:ea typeface="Arial Unicode MS"/>
-                <a:cs typeface="Arial Unicode MS"/>
-              </a:rPr>
-              <a:t>Berücksichtigen sie hierbei auch die Beschreibung der Schnittstellen!</a:t>
-            </a:r>
-            <a:endParaRPr/>
-          </a:p>
-        </p:txBody>
-      </p:sp>
+        </p:nvPicPr>
+        <p:blipFill>
+          <a:blip r:embed="rId2" cstate="print">
+            <a:extLst>
+              <a:ext uri="{28A0092B-C50C-407E-A947-70E740481C1C}">
+                <a14:useLocalDpi xmlns:a14="http://schemas.microsoft.com/office/drawing/2010/main" val="0"/>
+              </a:ext>
+            </a:extLst>
+          </a:blip>
+          <a:stretch>
+            <a:fillRect/>
+          </a:stretch>
+        </p:blipFill>
+        <p:spPr bwMode="auto">
+          <a:xfrm>
+            <a:off x="2839817" y="1280681"/>
+            <a:ext cx="4480365" cy="4071790"/>
+          </a:xfrm>
+        </p:spPr>
+      </p:pic>
       <p:sp>
         <p:nvSpPr>
           <p:cNvPr id="4" name="Titel 3"/>
@@ -3346,35 +3309,7 @@
               <a:buNone/>
               <a:defRPr/>
             </a:pPr>
-            <a:r>
-              <a:rPr lang="de-DE" sz="2000" b="0" i="0" u="none" strike="noStrike" cap="none" spc="0">
-                <a:solidFill>
-                  <a:srgbClr val="FF0000"/>
-                </a:solidFill>
-                <a:latin typeface="Arial Unicode MS"/>
-                <a:ea typeface="Arial Unicode MS"/>
-                <a:cs typeface="Arial Unicode MS"/>
-              </a:rPr>
-              <a:t>Beschreiben sie hier mit einem UML Komponentendiagramm bzw. Kompositionsstrukturdiagramm wie eine ausgewählte Komponente aus der oberen fachlichen Architekturebene weiter in Unterkomponenten zerlegt wird. </a:t>
-            </a:r>
-          </a:p>
-          <a:p>
-            <a:pPr marL="0" indent="0" algn="ctr">
-              <a:buNone/>
-              <a:defRPr/>
-            </a:pPr>
-            <a:r>
-              <a:rPr lang="de-DE" sz="2000" b="0" i="0" u="none" strike="noStrike" cap="none" spc="0">
-                <a:solidFill>
-                  <a:srgbClr val="FF0000"/>
-                </a:solidFill>
-                <a:latin typeface="Arial Unicode MS"/>
-                <a:ea typeface="Arial Unicode MS"/>
-                <a:cs typeface="Arial Unicode MS"/>
-              </a:rPr>
-              <a:t>Berücksichtigen sie hierbei auch die Beschreibung der Schnittstellen!</a:t>
-            </a:r>
-            <a:endParaRPr/>
+            <a:endParaRPr dirty="0"/>
           </a:p>
         </p:txBody>
       </p:sp>
@@ -3397,20 +3332,64 @@
               <a:defRPr/>
             </a:pPr>
             <a:r>
-              <a:rPr lang="de-DE"/>
-              <a:t>Fachliche Architekturebene: Structural View</a:t>
+              <a:rPr lang="de-DE" dirty="0"/>
+              <a:t>Fachliche Architekturebene: </a:t>
+            </a:r>
+            <a:r>
+              <a:rPr lang="de-DE" dirty="0" err="1"/>
+              <a:t>Structural</a:t>
+            </a:r>
+            <a:r>
+              <a:rPr lang="de-DE" dirty="0"/>
+              <a:t> View</a:t>
             </a:r>
             <a:br>
-              <a:rPr lang="de-DE"/>
+              <a:rPr lang="de-DE" dirty="0"/>
             </a:br>
             <a:r>
-              <a:rPr lang="de-DE" sz="2000"/>
-              <a:t>Komponente XY</a:t>
-            </a:r>
-            <a:endParaRPr lang="de-DE"/>
-          </a:p>
-        </p:txBody>
-      </p:sp>
+              <a:rPr lang="de-DE" sz="2000" dirty="0"/>
+              <a:t>Komponente Model</a:t>
+            </a:r>
+            <a:endParaRPr lang="de-DE" dirty="0"/>
+          </a:p>
+        </p:txBody>
+      </p:sp>
+      <p:pic>
+        <p:nvPicPr>
+          <p:cNvPr id="3" name="Picture 2">
+            <a:extLst>
+              <a:ext uri="{FF2B5EF4-FFF2-40B4-BE49-F238E27FC236}">
+                <a16:creationId xmlns:a16="http://schemas.microsoft.com/office/drawing/2014/main" id="{85AE6964-61FA-8620-9EF9-0A1BFB7048BC}"/>
+              </a:ext>
+            </a:extLst>
+          </p:cNvPr>
+          <p:cNvPicPr>
+            <a:picLocks noChangeAspect="1"/>
+          </p:cNvPicPr>
+          <p:nvPr/>
+        </p:nvPicPr>
+        <p:blipFill>
+          <a:blip r:embed="rId2" cstate="print">
+            <a:extLst>
+              <a:ext uri="{28A0092B-C50C-407E-A947-70E740481C1C}">
+                <a14:useLocalDpi xmlns:a14="http://schemas.microsoft.com/office/drawing/2010/main" val="0"/>
+              </a:ext>
+            </a:extLst>
+          </a:blip>
+          <a:stretch>
+            <a:fillRect/>
+          </a:stretch>
+        </p:blipFill>
+        <p:spPr>
+          <a:xfrm>
+            <a:off x="1551608" y="1489348"/>
+            <a:ext cx="6197158" cy="3719100"/>
+          </a:xfrm>
+          <a:prstGeom prst="rect">
+            <a:avLst/>
+          </a:prstGeom>
+        </p:spPr>
+      </p:pic>
     </p:spTree>
   </p:cSld>
   <p:clrMapOvr>
@@ -3455,17 +3434,17 @@
               <a:defRPr/>
             </a:pPr>
             <a:r>
-              <a:rPr lang="de-DE"/>
+              <a:rPr lang="de-DE" dirty="0"/>
               <a:t>Fachliche Architekturebene: Behavioral View</a:t>
             </a:r>
             <a:br>
-              <a:rPr lang="de-DE"/>
+              <a:rPr lang="de-DE" dirty="0"/>
             </a:br>
             <a:r>
-              <a:rPr lang="de-DE" sz="2000"/>
-              <a:t>Sequenzdiagramm für User-Story XYZ</a:t>
-            </a:r>
-            <a:endParaRPr lang="de-DE"/>
+              <a:rPr lang="de-DE" sz="2000" dirty="0"/>
+              <a:t>Sequenzdiagramm für Epic 1: Depotkonto eröffnen</a:t>
+            </a:r>
+            <a:endParaRPr lang="de-DE" dirty="0"/>
           </a:p>
         </p:txBody>
       </p:sp>
@@ -3493,47 +3472,46 @@
               <a:buNone/>
               <a:defRPr/>
             </a:pPr>
-            <a:r>
-              <a:rPr lang="de-DE">
-                <a:solidFill>
-                  <a:srgbClr val="FF0000"/>
-                </a:solidFill>
-              </a:rPr>
-              <a:t>Fügen Sie bitte Ihr Sequenzdiagram ein.</a:t>
-            </a:r>
-            <a:endParaRPr/>
-          </a:p>
-          <a:p>
-            <a:pPr marL="0" indent="0" algn="ctr">
-              <a:buNone/>
-              <a:defRPr/>
-            </a:pPr>
-            <a:r>
-              <a:rPr lang="de-DE">
-                <a:solidFill>
-                  <a:srgbClr val="FF0000"/>
-                </a:solidFill>
-              </a:rPr>
-              <a:t>(Entsprechend zu der User-Story (Use Case), der vorher ausgewählt wurde!)</a:t>
-            </a:r>
-          </a:p>
-          <a:p>
-            <a:pPr marL="0" indent="0" algn="ctr">
-              <a:buNone/>
-              <a:defRPr/>
-            </a:pPr>
-            <a:r>
-              <a:rPr lang="de-DE">
-                <a:solidFill>
-                  <a:srgbClr val="FF0000"/>
-                </a:solidFill>
-              </a:rPr>
-              <a:t>Beachte: Die Teilnehmer in dem Sequenzdiagramm müssen konsistent mit der fachlichen Architektur sein!</a:t>
-            </a:r>
-            <a:endParaRPr/>
-          </a:p>
-        </p:txBody>
-      </p:sp>
+            <a:endParaRPr dirty="0"/>
+          </a:p>
+        </p:txBody>
+      </p:sp>
+      <p:pic>
+        <p:nvPicPr>
+          <p:cNvPr id="5" name="Picture 4">
+            <a:extLst>
+              <a:ext uri="{FF2B5EF4-FFF2-40B4-BE49-F238E27FC236}">
+                <a16:creationId xmlns:a16="http://schemas.microsoft.com/office/drawing/2014/main" id="{78F5D28D-FE26-0EE3-F61C-831A47BCC601}"/>
+              </a:ext>
+            </a:extLst>
+          </p:cNvPr>
+          <p:cNvPicPr>
+            <a:picLocks noChangeAspect="1"/>
+          </p:cNvPicPr>
+          <p:nvPr/>
+        </p:nvPicPr>
+        <p:blipFill>
+          <a:blip r:embed="rId2" cstate="print">
+            <a:extLst>
+              <a:ext uri="{28A0092B-C50C-407E-A947-70E740481C1C}">
+                <a14:useLocalDpi xmlns:a14="http://schemas.microsoft.com/office/drawing/2010/main" val="0"/>
+              </a:ext>
+            </a:extLst>
+          </a:blip>
+          <a:stretch>
+            <a:fillRect/>
+          </a:stretch>
+        </p:blipFill>
+        <p:spPr>
+          <a:xfrm>
+            <a:off x="2534367" y="1459248"/>
+            <a:ext cx="5091265" cy="3762038"/>
+          </a:xfrm>
+          <a:prstGeom prst="rect">
+            <a:avLst/>
+          </a:prstGeom>
+        </p:spPr>
+      </p:pic>
     </p:spTree>
   </p:cSld>
   <p:clrMapOvr>
@@ -3543,7 +3521,7 @@
 </file>
 
 <file path=ppt/slides/slide2.xml><?xml version="1.0" encoding="utf-8"?>
-<p:sld xmlns:a="http://schemas.openxmlformats.org/drawingml/2006/main" xmlns:r="http://schemas.openxmlformats.org/officeDocument/2006/relationships" xmlns:p="http://schemas.openxmlformats.org/presentationml/2006/main" showMasterPhAnim="0" show="0">
+<p:sld xmlns:a="http://schemas.openxmlformats.org/drawingml/2006/main" xmlns:r="http://schemas.openxmlformats.org/officeDocument/2006/relationships" xmlns:p="http://schemas.openxmlformats.org/presentationml/2006/main" showMasterPhAnim="0">
   <p:cSld>
     <p:spTree>
       <p:nvGrpSpPr>

</xml_diff>